<commit_message>
#3 Define Database for Time Recorder
- Created the file
- finished following tasks:
+ Define Database for Time Recorder
+ Create a ERM
+ Create the relation modell (Create Testdata)
- I also did a update on the Mokup script, there were missing:
+ Places
+ ZIP-Code
</commit_message>
<xml_diff>
--- a/TimeRecorder_Desktop/Planing/TimeRecorderMokup.pptx
+++ b/TimeRecorder_Desktop/Planing/TimeRecorderMokup.pptx
@@ -711,7 +711,7 @@
           <a:p>
             <a:fld id="{E88C2BBA-BCEA-4D69-881F-C7DCE17B3328}" type="datetimeFigureOut">
               <a:rPr lang="de-DE" smtClean="0"/>
-              <a:t>25.08.2017</a:t>
+              <a:t>27.08.2017</a:t>
             </a:fld>
             <a:endParaRPr lang="de-DE"/>
           </a:p>
@@ -891,7 +891,7 @@
           <a:p>
             <a:fld id="{E88C2BBA-BCEA-4D69-881F-C7DCE17B3328}" type="datetimeFigureOut">
               <a:rPr lang="de-DE" smtClean="0"/>
-              <a:t>25.08.2017</a:t>
+              <a:t>27.08.2017</a:t>
             </a:fld>
             <a:endParaRPr lang="de-DE"/>
           </a:p>
@@ -1061,7 +1061,7 @@
           <a:p>
             <a:fld id="{E88C2BBA-BCEA-4D69-881F-C7DCE17B3328}" type="datetimeFigureOut">
               <a:rPr lang="de-DE" smtClean="0"/>
-              <a:t>25.08.2017</a:t>
+              <a:t>27.08.2017</a:t>
             </a:fld>
             <a:endParaRPr lang="de-DE"/>
           </a:p>
@@ -1307,7 +1307,7 @@
           <a:p>
             <a:fld id="{E88C2BBA-BCEA-4D69-881F-C7DCE17B3328}" type="datetimeFigureOut">
               <a:rPr lang="de-DE" smtClean="0"/>
-              <a:t>25.08.2017</a:t>
+              <a:t>27.08.2017</a:t>
             </a:fld>
             <a:endParaRPr lang="de-DE"/>
           </a:p>
@@ -1539,7 +1539,7 @@
           <a:p>
             <a:fld id="{E88C2BBA-BCEA-4D69-881F-C7DCE17B3328}" type="datetimeFigureOut">
               <a:rPr lang="de-DE" smtClean="0"/>
-              <a:t>25.08.2017</a:t>
+              <a:t>27.08.2017</a:t>
             </a:fld>
             <a:endParaRPr lang="de-DE"/>
           </a:p>
@@ -1906,7 +1906,7 @@
           <a:p>
             <a:fld id="{E88C2BBA-BCEA-4D69-881F-C7DCE17B3328}" type="datetimeFigureOut">
               <a:rPr lang="de-DE" smtClean="0"/>
-              <a:t>25.08.2017</a:t>
+              <a:t>27.08.2017</a:t>
             </a:fld>
             <a:endParaRPr lang="de-DE"/>
           </a:p>
@@ -2024,7 +2024,7 @@
           <a:p>
             <a:fld id="{E88C2BBA-BCEA-4D69-881F-C7DCE17B3328}" type="datetimeFigureOut">
               <a:rPr lang="de-DE" smtClean="0"/>
-              <a:t>25.08.2017</a:t>
+              <a:t>27.08.2017</a:t>
             </a:fld>
             <a:endParaRPr lang="de-DE"/>
           </a:p>
@@ -2119,7 +2119,7 @@
           <a:p>
             <a:fld id="{E88C2BBA-BCEA-4D69-881F-C7DCE17B3328}" type="datetimeFigureOut">
               <a:rPr lang="de-DE" smtClean="0"/>
-              <a:t>25.08.2017</a:t>
+              <a:t>27.08.2017</a:t>
             </a:fld>
             <a:endParaRPr lang="de-DE"/>
           </a:p>
@@ -2396,7 +2396,7 @@
           <a:p>
             <a:fld id="{E88C2BBA-BCEA-4D69-881F-C7DCE17B3328}" type="datetimeFigureOut">
               <a:rPr lang="de-DE" smtClean="0"/>
-              <a:t>25.08.2017</a:t>
+              <a:t>27.08.2017</a:t>
             </a:fld>
             <a:endParaRPr lang="de-DE"/>
           </a:p>
@@ -2649,7 +2649,7 @@
           <a:p>
             <a:fld id="{E88C2BBA-BCEA-4D69-881F-C7DCE17B3328}" type="datetimeFigureOut">
               <a:rPr lang="de-DE" smtClean="0"/>
-              <a:t>25.08.2017</a:t>
+              <a:t>27.08.2017</a:t>
             </a:fld>
             <a:endParaRPr lang="de-DE"/>
           </a:p>
@@ -2862,7 +2862,7 @@
           <a:p>
             <a:fld id="{E88C2BBA-BCEA-4D69-881F-C7DCE17B3328}" type="datetimeFigureOut">
               <a:rPr lang="de-DE" smtClean="0"/>
-              <a:t>25.08.2017</a:t>
+              <a:t>27.08.2017</a:t>
             </a:fld>
             <a:endParaRPr lang="de-DE"/>
           </a:p>
@@ -14240,7 +14240,7 @@
         </p:nvSpPr>
         <p:spPr>
           <a:xfrm>
-            <a:off x="7649430" y="2069458"/>
+            <a:off x="7649430" y="3028818"/>
             <a:ext cx="2798064" cy="359764"/>
           </a:xfrm>
           <a:prstGeom prst="rect">
@@ -14304,7 +14304,7 @@
         </p:nvSpPr>
         <p:spPr>
           <a:xfrm>
-            <a:off x="6036804" y="2085237"/>
+            <a:off x="6036804" y="3044597"/>
             <a:ext cx="1603709" cy="369332"/>
           </a:xfrm>
           <a:prstGeom prst="rect">
@@ -14342,7 +14342,7 @@
         </p:nvSpPr>
         <p:spPr>
           <a:xfrm>
-            <a:off x="6731937" y="2524518"/>
+            <a:off x="6731937" y="3483878"/>
             <a:ext cx="883575" cy="369332"/>
           </a:xfrm>
           <a:prstGeom prst="rect">
@@ -14376,7 +14376,7 @@
         </p:nvSpPr>
         <p:spPr>
           <a:xfrm>
-            <a:off x="7634403" y="2518075"/>
+            <a:off x="7634403" y="3477435"/>
             <a:ext cx="2798752" cy="359764"/>
           </a:xfrm>
           <a:prstGeom prst="rect">
@@ -14440,8 +14440,8 @@
         </p:nvSpPr>
         <p:spPr>
           <a:xfrm>
-            <a:off x="7632255" y="1630450"/>
-            <a:ext cx="2457526" cy="359764"/>
+            <a:off x="7632255" y="2589810"/>
+            <a:ext cx="2798064" cy="359764"/>
           </a:xfrm>
           <a:prstGeom prst="rect">
             <a:avLst/>
@@ -14504,7 +14504,7 @@
         </p:nvSpPr>
         <p:spPr>
           <a:xfrm>
-            <a:off x="6184455" y="1636894"/>
+            <a:off x="6184455" y="2596254"/>
             <a:ext cx="1444113" cy="369332"/>
           </a:xfrm>
           <a:prstGeom prst="rect">
@@ -14534,8 +14534,8 @@
         </p:nvSpPr>
         <p:spPr>
           <a:xfrm>
-            <a:off x="5543217" y="4308728"/>
-            <a:ext cx="5419882" cy="1200329"/>
+            <a:off x="7596396" y="4939395"/>
+            <a:ext cx="3565207" cy="1477328"/>
           </a:xfrm>
           <a:prstGeom prst="rect">
             <a:avLst/>
@@ -14604,6 +14604,13 @@
               </a:rPr>
               <a:t>, </a:t>
             </a:r>
+            <a:endParaRPr lang="de-DE" b="1" dirty="0" smtClean="0">
+              <a:solidFill>
+                <a:srgbClr val="00B050"/>
+              </a:solidFill>
+            </a:endParaRPr>
+          </a:p>
+          <a:p>
             <a:r>
               <a:rPr lang="de-DE" b="1" dirty="0" err="1" smtClean="0">
                 <a:solidFill>
@@ -14650,10 +14657,8 @@
                   <a:srgbClr val="00B050"/>
                 </a:solidFill>
               </a:rPr>
-              <a:t>.</a:t>
-            </a:r>
-          </a:p>
-          <a:p>
+              <a:t>. </a:t>
+            </a:r>
             <a:r>
               <a:rPr lang="de-DE" b="1" dirty="0" err="1" smtClean="0">
                 <a:solidFill>
@@ -14718,24 +14723,53 @@
                   <a:srgbClr val="00B050"/>
                 </a:solidFill>
               </a:rPr>
-              <a:t>.</a:t>
-            </a:r>
-          </a:p>
-          <a:p>
+              <a:t>. After </a:t>
+            </a:r>
+            <a:r>
+              <a:rPr lang="de-DE" b="1" dirty="0" err="1" smtClean="0">
+                <a:solidFill>
+                  <a:srgbClr val="00B050"/>
+                </a:solidFill>
+              </a:rPr>
+              <a:t>the</a:t>
+            </a:r>
             <a:r>
               <a:rPr lang="de-DE" b="1" dirty="0" smtClean="0">
                 <a:solidFill>
                   <a:srgbClr val="00B050"/>
                 </a:solidFill>
               </a:rPr>
-              <a:t>After </a:t>
-            </a:r>
+              <a:t> first </a:t>
+            </a:r>
+            <a:endParaRPr lang="de-DE" b="1" dirty="0" smtClean="0">
+              <a:solidFill>
+                <a:srgbClr val="00B050"/>
+              </a:solidFill>
+            </a:endParaRPr>
+          </a:p>
+          <a:p>
             <a:r>
               <a:rPr lang="de-DE" b="1" dirty="0" err="1" smtClean="0">
                 <a:solidFill>
                   <a:srgbClr val="00B050"/>
                 </a:solidFill>
               </a:rPr>
+              <a:t>login</a:t>
+            </a:r>
+            <a:r>
+              <a:rPr lang="de-DE" b="1" dirty="0" smtClean="0">
+                <a:solidFill>
+                  <a:srgbClr val="00B050"/>
+                </a:solidFill>
+              </a:rPr>
+              <a:t>, </a:t>
+            </a:r>
+            <a:r>
+              <a:rPr lang="de-DE" b="1" dirty="0" err="1" smtClean="0">
+                <a:solidFill>
+                  <a:srgbClr val="00B050"/>
+                </a:solidFill>
+              </a:rPr>
               <a:t>the</a:t>
             </a:r>
             <a:r>
@@ -14744,7 +14778,7 @@
                   <a:srgbClr val="00B050"/>
                 </a:solidFill>
               </a:rPr>
-              <a:t> first </a:t>
+              <a:t> </a:t>
             </a:r>
             <a:r>
               <a:rPr lang="de-DE" b="1" dirty="0" err="1" smtClean="0">
@@ -14752,7 +14786,7 @@
                   <a:srgbClr val="00B050"/>
                 </a:solidFill>
               </a:rPr>
-              <a:t>login</a:t>
+              <a:t>user</a:t>
             </a:r>
             <a:r>
               <a:rPr lang="de-DE" b="1" dirty="0" smtClean="0">
@@ -14760,7 +14794,7 @@
                   <a:srgbClr val="00B050"/>
                 </a:solidFill>
               </a:rPr>
-              <a:t>, </a:t>
+              <a:t> must </a:t>
             </a:r>
             <a:r>
               <a:rPr lang="de-DE" b="1" dirty="0" err="1" smtClean="0">
@@ -14768,7 +14802,7 @@
                   <a:srgbClr val="00B050"/>
                 </a:solidFill>
               </a:rPr>
-              <a:t>the</a:t>
+              <a:t>set</a:t>
             </a:r>
             <a:r>
               <a:rPr lang="de-DE" b="1" dirty="0" smtClean="0">
@@ -14776,40 +14810,15 @@
                   <a:srgbClr val="00B050"/>
                 </a:solidFill>
               </a:rPr>
-              <a:t> </a:t>
-            </a:r>
-            <a:r>
-              <a:rPr lang="de-DE" b="1" dirty="0" err="1" smtClean="0">
-                <a:solidFill>
-                  <a:srgbClr val="00B050"/>
-                </a:solidFill>
-              </a:rPr>
-              <a:t>user</a:t>
-            </a:r>
-            <a:r>
-              <a:rPr lang="de-DE" b="1" dirty="0" smtClean="0">
-                <a:solidFill>
-                  <a:srgbClr val="00B050"/>
-                </a:solidFill>
-              </a:rPr>
-              <a:t> must </a:t>
-            </a:r>
-            <a:r>
-              <a:rPr lang="de-DE" b="1" dirty="0" err="1" smtClean="0">
-                <a:solidFill>
-                  <a:srgbClr val="00B050"/>
-                </a:solidFill>
-              </a:rPr>
-              <a:t>set</a:t>
-            </a:r>
-            <a:r>
-              <a:rPr lang="de-DE" b="1" dirty="0" smtClean="0">
-                <a:solidFill>
-                  <a:srgbClr val="00B050"/>
-                </a:solidFill>
-              </a:rPr>
               <a:t> a new </a:t>
             </a:r>
+            <a:endParaRPr lang="de-DE" b="1" dirty="0" smtClean="0">
+              <a:solidFill>
+                <a:srgbClr val="00B050"/>
+              </a:solidFill>
+            </a:endParaRPr>
+          </a:p>
+          <a:p>
             <a:r>
               <a:rPr lang="de-DE" b="1" dirty="0" err="1" smtClean="0">
                 <a:solidFill>
@@ -14837,7 +14846,7 @@
         </p:nvSpPr>
         <p:spPr>
           <a:xfrm>
-            <a:off x="6302301" y="3057763"/>
+            <a:off x="6302301" y="4017123"/>
             <a:ext cx="1322991" cy="369332"/>
           </a:xfrm>
           <a:prstGeom prst="rect">
@@ -14871,7 +14880,7 @@
         </p:nvSpPr>
         <p:spPr>
           <a:xfrm>
-            <a:off x="7634675" y="3067331"/>
+            <a:off x="7634675" y="4026691"/>
             <a:ext cx="2442536" cy="359764"/>
           </a:xfrm>
           <a:prstGeom prst="rect">
@@ -14928,7 +14937,7 @@
         </p:nvSpPr>
         <p:spPr>
           <a:xfrm>
-            <a:off x="7673761" y="3075397"/>
+            <a:off x="7673761" y="4034757"/>
             <a:ext cx="676788" cy="369332"/>
           </a:xfrm>
           <a:prstGeom prst="rect">
@@ -14958,7 +14967,7 @@
         </p:nvSpPr>
         <p:spPr>
           <a:xfrm rot="10800000">
-            <a:off x="9839456" y="3151648"/>
+            <a:off x="9839456" y="4111008"/>
             <a:ext cx="191710" cy="235747"/>
           </a:xfrm>
           <a:prstGeom prst="triangle">
@@ -15003,7 +15012,7 @@
         </p:nvSpPr>
         <p:spPr>
           <a:xfrm>
-            <a:off x="7640513" y="3425219"/>
+            <a:off x="7640513" y="4384579"/>
             <a:ext cx="2436698" cy="417940"/>
           </a:xfrm>
           <a:prstGeom prst="rect">
@@ -15055,7 +15064,7 @@
         </p:nvSpPr>
         <p:spPr>
           <a:xfrm>
-            <a:off x="7634675" y="3473827"/>
+            <a:off x="7634675" y="4433187"/>
             <a:ext cx="1476238" cy="369332"/>
           </a:xfrm>
           <a:prstGeom prst="rect">
@@ -15085,7 +15094,7 @@
         </p:nvSpPr>
         <p:spPr>
           <a:xfrm>
-            <a:off x="3722140" y="3016725"/>
+            <a:off x="3740754" y="3451352"/>
             <a:ext cx="2607702" cy="1477328"/>
           </a:xfrm>
           <a:prstGeom prst="rect">
@@ -15197,11 +15206,203 @@
               </a:rPr>
               <a:t>- User</a:t>
             </a:r>
-            <a:endParaRPr lang="de-DE" b="1" dirty="0" smtClean="0">
+          </a:p>
+        </p:txBody>
+      </p:sp>
+      <p:sp>
+        <p:nvSpPr>
+          <p:cNvPr id="39" name="Rechteck 38"/>
+          <p:cNvSpPr/>
+          <p:nvPr/>
+        </p:nvSpPr>
+        <p:spPr>
+          <a:xfrm>
+            <a:off x="7615512" y="2082771"/>
+            <a:ext cx="1153734" cy="359764"/>
+          </a:xfrm>
+          <a:prstGeom prst="rect">
+            <a:avLst/>
+          </a:prstGeom>
+          <a:solidFill>
+            <a:schemeClr val="bg1"/>
+          </a:solidFill>
+          <a:ln>
+            <a:solidFill>
+              <a:schemeClr val="tx1"/>
+            </a:solidFill>
+          </a:ln>
+        </p:spPr>
+        <p:style>
+          <a:lnRef idx="2">
+            <a:schemeClr val="accent1">
+              <a:shade val="50000"/>
+            </a:schemeClr>
+          </a:lnRef>
+          <a:fillRef idx="1">
+            <a:schemeClr val="accent1"/>
+          </a:fillRef>
+          <a:effectRef idx="0">
+            <a:schemeClr val="accent1"/>
+          </a:effectRef>
+          <a:fontRef idx="minor">
+            <a:schemeClr val="lt1"/>
+          </a:fontRef>
+        </p:style>
+        <p:txBody>
+          <a:bodyPr rot="0" spcFirstLastPara="0" vertOverflow="overflow" horzOverflow="overflow" vert="horz" wrap="square" lIns="91440" tIns="45720" rIns="91440" bIns="45720" numCol="1" spcCol="0" rtlCol="0" fromWordArt="0" anchor="ctr" anchorCtr="0" forceAA="0" compatLnSpc="1">
+            <a:prstTxWarp prst="textNoShape">
+              <a:avLst/>
+            </a:prstTxWarp>
+            <a:noAutofit/>
+          </a:bodyPr>
+          <a:lstStyle/>
+          <a:p>
+            <a:pPr algn="ctr"/>
+            <a:r>
+              <a:rPr lang="de-DE" dirty="0" smtClean="0">
+                <a:solidFill>
+                  <a:schemeClr val="tx1"/>
+                </a:solidFill>
+              </a:rPr>
+              <a:t>2452</a:t>
+            </a:r>
+            <a:endParaRPr lang="de-DE" dirty="0">
               <a:solidFill>
-                <a:srgbClr val="00B050"/>
+                <a:schemeClr val="tx1"/>
               </a:solidFill>
             </a:endParaRPr>
+          </a:p>
+        </p:txBody>
+      </p:sp>
+      <p:sp>
+        <p:nvSpPr>
+          <p:cNvPr id="40" name="Rechteck 39"/>
+          <p:cNvSpPr/>
+          <p:nvPr/>
+        </p:nvSpPr>
+        <p:spPr>
+          <a:xfrm>
+            <a:off x="7615512" y="1634154"/>
+            <a:ext cx="2798064" cy="359764"/>
+          </a:xfrm>
+          <a:prstGeom prst="rect">
+            <a:avLst/>
+          </a:prstGeom>
+          <a:solidFill>
+            <a:schemeClr val="bg1"/>
+          </a:solidFill>
+          <a:ln>
+            <a:solidFill>
+              <a:schemeClr val="tx1"/>
+            </a:solidFill>
+          </a:ln>
+        </p:spPr>
+        <p:style>
+          <a:lnRef idx="2">
+            <a:schemeClr val="accent1">
+              <a:shade val="50000"/>
+            </a:schemeClr>
+          </a:lnRef>
+          <a:fillRef idx="1">
+            <a:schemeClr val="accent1"/>
+          </a:fillRef>
+          <a:effectRef idx="0">
+            <a:schemeClr val="accent1"/>
+          </a:effectRef>
+          <a:fontRef idx="minor">
+            <a:schemeClr val="lt1"/>
+          </a:fontRef>
+        </p:style>
+        <p:txBody>
+          <a:bodyPr rot="0" spcFirstLastPara="0" vertOverflow="overflow" horzOverflow="overflow" vert="horz" wrap="square" lIns="91440" tIns="45720" rIns="91440" bIns="45720" numCol="1" spcCol="0" rtlCol="0" fromWordArt="0" anchor="ctr" anchorCtr="0" forceAA="0" compatLnSpc="1">
+            <a:prstTxWarp prst="textNoShape">
+              <a:avLst/>
+            </a:prstTxWarp>
+            <a:noAutofit/>
+          </a:bodyPr>
+          <a:lstStyle/>
+          <a:p>
+            <a:r>
+              <a:rPr lang="de-DE" dirty="0" err="1" smtClean="0">
+                <a:solidFill>
+                  <a:schemeClr val="tx1"/>
+                </a:solidFill>
+              </a:rPr>
+              <a:t>Mannersdorf</a:t>
+            </a:r>
+            <a:r>
+              <a:rPr lang="de-DE" dirty="0" smtClean="0">
+                <a:solidFill>
+                  <a:schemeClr val="tx1"/>
+                </a:solidFill>
+              </a:rPr>
+              <a:t> an der Leitha</a:t>
+            </a:r>
+            <a:endParaRPr lang="de-DE" dirty="0">
+              <a:solidFill>
+                <a:schemeClr val="tx1"/>
+              </a:solidFill>
+            </a:endParaRPr>
+          </a:p>
+        </p:txBody>
+      </p:sp>
+      <p:sp>
+        <p:nvSpPr>
+          <p:cNvPr id="45" name="Textfeld 44"/>
+          <p:cNvSpPr txBox="1"/>
+          <p:nvPr/>
+        </p:nvSpPr>
+        <p:spPr>
+          <a:xfrm>
+            <a:off x="6800985" y="1606123"/>
+            <a:ext cx="795411" cy="369332"/>
+          </a:xfrm>
+          <a:prstGeom prst="rect">
+            <a:avLst/>
+          </a:prstGeom>
+          <a:noFill/>
+        </p:spPr>
+        <p:txBody>
+          <a:bodyPr wrap="none" rtlCol="0">
+            <a:spAutoFit/>
+          </a:bodyPr>
+          <a:lstStyle/>
+          <a:p>
+            <a:r>
+              <a:rPr lang="de-DE" dirty="0" smtClean="0"/>
+              <a:t>Place: </a:t>
+            </a:r>
+            <a:endParaRPr lang="de-DE" dirty="0"/>
+          </a:p>
+        </p:txBody>
+      </p:sp>
+      <p:sp>
+        <p:nvSpPr>
+          <p:cNvPr id="46" name="Textfeld 45"/>
+          <p:cNvSpPr txBox="1"/>
+          <p:nvPr/>
+        </p:nvSpPr>
+        <p:spPr>
+          <a:xfrm>
+            <a:off x="6446381" y="2101759"/>
+            <a:ext cx="1136850" cy="369332"/>
+          </a:xfrm>
+          <a:prstGeom prst="rect">
+            <a:avLst/>
+          </a:prstGeom>
+          <a:noFill/>
+        </p:spPr>
+        <p:txBody>
+          <a:bodyPr wrap="none" rtlCol="0">
+            <a:spAutoFit/>
+          </a:bodyPr>
+          <a:lstStyle/>
+          <a:p>
+            <a:r>
+              <a:rPr lang="de-DE" dirty="0" smtClean="0"/>
+              <a:t>ZIP-Code: </a:t>
+            </a:r>
+            <a:endParaRPr lang="de-DE" dirty="0"/>
           </a:p>
         </p:txBody>
       </p:sp>
@@ -16002,14 +16203,68 @@
       </p:sp>
       <p:sp>
         <p:nvSpPr>
-          <p:cNvPr id="19" name="Rechteck 18"/>
+          <p:cNvPr id="26" name="Textfeld 25"/>
+          <p:cNvSpPr txBox="1"/>
+          <p:nvPr/>
+        </p:nvSpPr>
+        <p:spPr>
+          <a:xfrm>
+            <a:off x="4538028" y="4956652"/>
+            <a:ext cx="2997552" cy="369332"/>
+          </a:xfrm>
+          <a:prstGeom prst="rect">
+            <a:avLst/>
+          </a:prstGeom>
+          <a:noFill/>
+        </p:spPr>
+        <p:txBody>
+          <a:bodyPr wrap="none" rtlCol="0">
+            <a:spAutoFit/>
+          </a:bodyPr>
+          <a:lstStyle/>
+          <a:p>
+            <a:r>
+              <a:rPr lang="de-DE" dirty="0" smtClean="0"/>
+              <a:t>Set back </a:t>
+            </a:r>
+            <a:r>
+              <a:rPr lang="de-DE" dirty="0" err="1" smtClean="0"/>
+              <a:t>to</a:t>
+            </a:r>
+            <a:r>
+              <a:rPr lang="de-DE" dirty="0" smtClean="0"/>
+              <a:t> </a:t>
+            </a:r>
+            <a:r>
+              <a:rPr lang="de-DE" dirty="0" err="1" smtClean="0"/>
+              <a:t>default</a:t>
+            </a:r>
+            <a:r>
+              <a:rPr lang="de-DE" dirty="0" smtClean="0"/>
+              <a:t> </a:t>
+            </a:r>
+            <a:r>
+              <a:rPr lang="de-DE" dirty="0" err="1" smtClean="0"/>
+              <a:t>password</a:t>
+            </a:r>
+            <a:r>
+              <a:rPr lang="de-DE" dirty="0" smtClean="0"/>
+              <a:t>: </a:t>
+            </a:r>
+            <a:endParaRPr lang="de-DE" dirty="0"/>
+          </a:p>
+        </p:txBody>
+      </p:sp>
+      <p:sp>
+        <p:nvSpPr>
+          <p:cNvPr id="27" name="Rechteck 26"/>
           <p:cNvSpPr/>
           <p:nvPr/>
         </p:nvSpPr>
         <p:spPr>
           <a:xfrm>
-            <a:off x="7649430" y="2069458"/>
-            <a:ext cx="2798064" cy="359764"/>
+            <a:off x="7629050" y="4950208"/>
+            <a:ext cx="277904" cy="359764"/>
           </a:xfrm>
           <a:prstGeom prst="rect">
             <a:avLst/>
@@ -16040,7 +16295,7 @@
           </a:fontRef>
         </p:style>
         <p:txBody>
-          <a:bodyPr rot="0" spcFirstLastPara="0" vertOverflow="overflow" horzOverflow="overflow" vert="horz" wrap="square" lIns="91440" tIns="45720" rIns="914400" bIns="45720" numCol="1" spcCol="0" rtlCol="0" fromWordArt="0" anchor="ctr" anchorCtr="0" forceAA="0" compatLnSpc="1">
+          <a:bodyPr rot="0" spcFirstLastPara="0" vertOverflow="overflow" horzOverflow="overflow" vert="horz" wrap="square" lIns="91440" tIns="45720" rIns="91440" bIns="45720" numCol="1" spcCol="0" rtlCol="0" fromWordArt="0" anchor="ctr" anchorCtr="0" forceAA="0" compatLnSpc="1">
             <a:prstTxWarp prst="textNoShape">
               <a:avLst/>
             </a:prstTxWarp>
@@ -16049,12 +16304,12 @@
           <a:lstStyle/>
           <a:p>
             <a:r>
-              <a:rPr lang="de-DE" dirty="0" err="1" smtClean="0">
+              <a:rPr lang="de-DE" dirty="0" smtClean="0">
                 <a:solidFill>
                   <a:schemeClr val="tx1"/>
                 </a:solidFill>
               </a:rPr>
-              <a:t>mamu</a:t>
+              <a:t>X</a:t>
             </a:r>
             <a:endParaRPr lang="de-DE" dirty="0">
               <a:solidFill>
@@ -16066,86 +16321,14 @@
       </p:sp>
       <p:sp>
         <p:nvSpPr>
-          <p:cNvPr id="20" name="Textfeld 19"/>
-          <p:cNvSpPr txBox="1"/>
-          <p:nvPr/>
-        </p:nvSpPr>
-        <p:spPr>
-          <a:xfrm>
-            <a:off x="6036804" y="2085237"/>
-            <a:ext cx="1603709" cy="369332"/>
-          </a:xfrm>
-          <a:prstGeom prst="rect">
-            <a:avLst/>
-          </a:prstGeom>
-          <a:noFill/>
-        </p:spPr>
-        <p:txBody>
-          <a:bodyPr wrap="none" rtlCol="0">
-            <a:spAutoFit/>
-          </a:bodyPr>
-          <a:lstStyle/>
-          <a:p>
-            <a:r>
-              <a:rPr lang="de-DE" dirty="0" smtClean="0"/>
-              <a:t>User-</a:t>
-            </a:r>
-            <a:r>
-              <a:rPr lang="de-DE" dirty="0" err="1" smtClean="0"/>
-              <a:t>shortcut</a:t>
-            </a:r>
-            <a:r>
-              <a:rPr lang="de-DE" dirty="0" smtClean="0"/>
-              <a:t>: </a:t>
-            </a:r>
-            <a:endParaRPr lang="de-DE" dirty="0"/>
-          </a:p>
-        </p:txBody>
-      </p:sp>
-      <p:sp>
-        <p:nvSpPr>
-          <p:cNvPr id="21" name="Textfeld 20"/>
-          <p:cNvSpPr txBox="1"/>
-          <p:nvPr/>
-        </p:nvSpPr>
-        <p:spPr>
-          <a:xfrm>
-            <a:off x="6731937" y="2511639"/>
-            <a:ext cx="883575" cy="369332"/>
-          </a:xfrm>
-          <a:prstGeom prst="rect">
-            <a:avLst/>
-          </a:prstGeom>
-          <a:noFill/>
-        </p:spPr>
-        <p:txBody>
-          <a:bodyPr wrap="none" rtlCol="0">
-            <a:spAutoFit/>
-          </a:bodyPr>
-          <a:lstStyle/>
-          <a:p>
-            <a:r>
-              <a:rPr lang="de-DE" dirty="0" err="1" smtClean="0"/>
-              <a:t>e-mail</a:t>
-            </a:r>
-            <a:r>
-              <a:rPr lang="de-DE" dirty="0" smtClean="0"/>
-              <a:t>: </a:t>
-            </a:r>
-            <a:endParaRPr lang="de-DE" dirty="0"/>
-          </a:p>
-        </p:txBody>
-      </p:sp>
-      <p:sp>
-        <p:nvSpPr>
-          <p:cNvPr id="22" name="Rechteck 21"/>
+          <p:cNvPr id="31" name="Rechteck 30"/>
           <p:cNvSpPr/>
           <p:nvPr/>
         </p:nvSpPr>
         <p:spPr>
           <a:xfrm>
-            <a:off x="7634403" y="2505196"/>
-            <a:ext cx="2798752" cy="359764"/>
+            <a:off x="7649430" y="3028818"/>
+            <a:ext cx="2798064" cy="359764"/>
           </a:xfrm>
           <a:prstGeom prst="rect">
             <a:avLst/>
@@ -16176,7 +16359,7 @@
           </a:fontRef>
         </p:style>
         <p:txBody>
-          <a:bodyPr rot="0" spcFirstLastPara="0" vertOverflow="overflow" horzOverflow="overflow" vert="horz" wrap="square" lIns="91440" tIns="45720" rIns="91440" bIns="45720" numCol="1" spcCol="0" rtlCol="0" fromWordArt="0" anchor="ctr" anchorCtr="0" forceAA="0" compatLnSpc="1">
+          <a:bodyPr rot="0" spcFirstLastPara="0" vertOverflow="overflow" horzOverflow="overflow" vert="horz" wrap="square" lIns="91440" tIns="45720" rIns="914400" bIns="45720" numCol="1" spcCol="0" rtlCol="0" fromWordArt="0" anchor="ctr" anchorCtr="0" forceAA="0" compatLnSpc="1">
             <a:prstTxWarp prst="textNoShape">
               <a:avLst/>
             </a:prstTxWarp>
@@ -16185,12 +16368,12 @@
           <a:lstStyle/>
           <a:p>
             <a:r>
-              <a:rPr lang="de-DE" dirty="0" smtClean="0">
+              <a:rPr lang="de-DE" dirty="0" err="1" smtClean="0">
                 <a:solidFill>
                   <a:schemeClr val="tx1"/>
                 </a:solidFill>
               </a:rPr>
-              <a:t>Max.mustermail@mail.com</a:t>
+              <a:t>mamu</a:t>
             </a:r>
             <a:endParaRPr lang="de-DE" dirty="0">
               <a:solidFill>
@@ -16202,14 +16385,86 @@
       </p:sp>
       <p:sp>
         <p:nvSpPr>
-          <p:cNvPr id="23" name="Rechteck 22"/>
+          <p:cNvPr id="32" name="Textfeld 31"/>
+          <p:cNvSpPr txBox="1"/>
+          <p:nvPr/>
+        </p:nvSpPr>
+        <p:spPr>
+          <a:xfrm>
+            <a:off x="6036804" y="3044597"/>
+            <a:ext cx="1603709" cy="369332"/>
+          </a:xfrm>
+          <a:prstGeom prst="rect">
+            <a:avLst/>
+          </a:prstGeom>
+          <a:noFill/>
+        </p:spPr>
+        <p:txBody>
+          <a:bodyPr wrap="none" rtlCol="0">
+            <a:spAutoFit/>
+          </a:bodyPr>
+          <a:lstStyle/>
+          <a:p>
+            <a:r>
+              <a:rPr lang="de-DE" dirty="0" smtClean="0"/>
+              <a:t>User-</a:t>
+            </a:r>
+            <a:r>
+              <a:rPr lang="de-DE" dirty="0" err="1" smtClean="0"/>
+              <a:t>shortcut</a:t>
+            </a:r>
+            <a:r>
+              <a:rPr lang="de-DE" dirty="0" smtClean="0"/>
+              <a:t>: </a:t>
+            </a:r>
+            <a:endParaRPr lang="de-DE" dirty="0"/>
+          </a:p>
+        </p:txBody>
+      </p:sp>
+      <p:sp>
+        <p:nvSpPr>
+          <p:cNvPr id="33" name="Textfeld 32"/>
+          <p:cNvSpPr txBox="1"/>
+          <p:nvPr/>
+        </p:nvSpPr>
+        <p:spPr>
+          <a:xfrm>
+            <a:off x="6731937" y="3483878"/>
+            <a:ext cx="883575" cy="369332"/>
+          </a:xfrm>
+          <a:prstGeom prst="rect">
+            <a:avLst/>
+          </a:prstGeom>
+          <a:noFill/>
+        </p:spPr>
+        <p:txBody>
+          <a:bodyPr wrap="none" rtlCol="0">
+            <a:spAutoFit/>
+          </a:bodyPr>
+          <a:lstStyle/>
+          <a:p>
+            <a:r>
+              <a:rPr lang="de-DE" dirty="0" err="1" smtClean="0"/>
+              <a:t>e-mail</a:t>
+            </a:r>
+            <a:r>
+              <a:rPr lang="de-DE" dirty="0" smtClean="0"/>
+              <a:t>: </a:t>
+            </a:r>
+            <a:endParaRPr lang="de-DE" dirty="0"/>
+          </a:p>
+        </p:txBody>
+      </p:sp>
+      <p:sp>
+        <p:nvSpPr>
+          <p:cNvPr id="34" name="Rechteck 33"/>
           <p:cNvSpPr/>
           <p:nvPr/>
         </p:nvSpPr>
         <p:spPr>
           <a:xfrm>
-            <a:off x="7632255" y="1630450"/>
-            <a:ext cx="2457526" cy="359764"/>
+            <a:off x="7634403" y="3477435"/>
+            <a:ext cx="2798752" cy="359764"/>
           </a:xfrm>
           <a:prstGeom prst="rect">
             <a:avLst/>
@@ -16240,7 +16495,7 @@
           </a:fontRef>
         </p:style>
         <p:txBody>
-          <a:bodyPr rot="0" spcFirstLastPara="0" vertOverflow="overflow" horzOverflow="overflow" vert="horz" wrap="square" lIns="91440" tIns="45720" rIns="914400" bIns="45720" numCol="1" spcCol="0" rtlCol="0" fromWordArt="0" anchor="ctr" anchorCtr="0" forceAA="0" compatLnSpc="1">
+          <a:bodyPr rot="0" spcFirstLastPara="0" vertOverflow="overflow" horzOverflow="overflow" vert="horz" wrap="square" lIns="91440" tIns="45720" rIns="91440" bIns="45720" numCol="1" spcCol="0" rtlCol="0" fromWordArt="0" anchor="ctr" anchorCtr="0" forceAA="0" compatLnSpc="1">
             <a:prstTxWarp prst="textNoShape">
               <a:avLst/>
             </a:prstTxWarp>
@@ -16254,7 +16509,7 @@
                   <a:schemeClr val="tx1"/>
                 </a:solidFill>
               </a:rPr>
-              <a:t>Office</a:t>
+              <a:t>Max.mustermail@mail.com</a:t>
             </a:r>
             <a:endParaRPr lang="de-DE" dirty="0">
               <a:solidFill>
@@ -16266,98 +16521,14 @@
       </p:sp>
       <p:sp>
         <p:nvSpPr>
-          <p:cNvPr id="24" name="Textfeld 23"/>
-          <p:cNvSpPr txBox="1"/>
-          <p:nvPr/>
-        </p:nvSpPr>
-        <p:spPr>
-          <a:xfrm>
-            <a:off x="6184455" y="1636894"/>
-            <a:ext cx="1444113" cy="369332"/>
-          </a:xfrm>
-          <a:prstGeom prst="rect">
-            <a:avLst/>
-          </a:prstGeom>
-          <a:noFill/>
-        </p:spPr>
-        <p:txBody>
-          <a:bodyPr wrap="none" rtlCol="0">
-            <a:spAutoFit/>
-          </a:bodyPr>
-          <a:lstStyle/>
-          <a:p>
-            <a:r>
-              <a:rPr lang="de-DE" dirty="0" smtClean="0"/>
-              <a:t>Department: </a:t>
-            </a:r>
-            <a:endParaRPr lang="de-DE" dirty="0"/>
-          </a:p>
-        </p:txBody>
-      </p:sp>
-      <p:sp>
-        <p:nvSpPr>
-          <p:cNvPr id="26" name="Textfeld 25"/>
-          <p:cNvSpPr txBox="1"/>
-          <p:nvPr/>
-        </p:nvSpPr>
-        <p:spPr>
-          <a:xfrm>
-            <a:off x="4545881" y="4043339"/>
-            <a:ext cx="2997552" cy="369332"/>
-          </a:xfrm>
-          <a:prstGeom prst="rect">
-            <a:avLst/>
-          </a:prstGeom>
-          <a:noFill/>
-        </p:spPr>
-        <p:txBody>
-          <a:bodyPr wrap="none" rtlCol="0">
-            <a:spAutoFit/>
-          </a:bodyPr>
-          <a:lstStyle/>
-          <a:p>
-            <a:r>
-              <a:rPr lang="de-DE" dirty="0" smtClean="0"/>
-              <a:t>Set back </a:t>
-            </a:r>
-            <a:r>
-              <a:rPr lang="de-DE" dirty="0" err="1" smtClean="0"/>
-              <a:t>to</a:t>
-            </a:r>
-            <a:r>
-              <a:rPr lang="de-DE" dirty="0" smtClean="0"/>
-              <a:t> </a:t>
-            </a:r>
-            <a:r>
-              <a:rPr lang="de-DE" dirty="0" err="1" smtClean="0"/>
-              <a:t>default</a:t>
-            </a:r>
-            <a:r>
-              <a:rPr lang="de-DE" dirty="0" smtClean="0"/>
-              <a:t> </a:t>
-            </a:r>
-            <a:r>
-              <a:rPr lang="de-DE" dirty="0" err="1" smtClean="0"/>
-              <a:t>password</a:t>
-            </a:r>
-            <a:r>
-              <a:rPr lang="de-DE" dirty="0" smtClean="0"/>
-              <a:t>: </a:t>
-            </a:r>
-            <a:endParaRPr lang="de-DE" dirty="0"/>
-          </a:p>
-        </p:txBody>
-      </p:sp>
-      <p:sp>
-        <p:nvSpPr>
-          <p:cNvPr id="27" name="Rechteck 26"/>
+          <p:cNvPr id="35" name="Rechteck 34"/>
           <p:cNvSpPr/>
           <p:nvPr/>
         </p:nvSpPr>
         <p:spPr>
           <a:xfrm>
-            <a:off x="7636903" y="4036895"/>
-            <a:ext cx="277904" cy="359764"/>
+            <a:off x="7632255" y="2589810"/>
+            <a:ext cx="2798064" cy="359764"/>
           </a:xfrm>
           <a:prstGeom prst="rect">
             <a:avLst/>
@@ -16388,7 +16559,7 @@
           </a:fontRef>
         </p:style>
         <p:txBody>
-          <a:bodyPr rot="0" spcFirstLastPara="0" vertOverflow="overflow" horzOverflow="overflow" vert="horz" wrap="square" lIns="91440" tIns="45720" rIns="91440" bIns="45720" numCol="1" spcCol="0" rtlCol="0" fromWordArt="0" anchor="ctr" anchorCtr="0" forceAA="0" compatLnSpc="1">
+          <a:bodyPr rot="0" spcFirstLastPara="0" vertOverflow="overflow" horzOverflow="overflow" vert="horz" wrap="square" lIns="91440" tIns="45720" rIns="914400" bIns="45720" numCol="1" spcCol="0" rtlCol="0" fromWordArt="0" anchor="ctr" anchorCtr="0" forceAA="0" compatLnSpc="1">
             <a:prstTxWarp prst="textNoShape">
               <a:avLst/>
             </a:prstTxWarp>
@@ -16402,7 +16573,7 @@
                   <a:schemeClr val="tx1"/>
                 </a:solidFill>
               </a:rPr>
-              <a:t>X</a:t>
+              <a:t>Office</a:t>
             </a:r>
             <a:endParaRPr lang="de-DE" dirty="0">
               <a:solidFill>
@@ -16414,14 +16585,14 @@
       </p:sp>
       <p:sp>
         <p:nvSpPr>
-          <p:cNvPr id="37" name="Textfeld 36"/>
+          <p:cNvPr id="36" name="Textfeld 35"/>
           <p:cNvSpPr txBox="1"/>
           <p:nvPr/>
         </p:nvSpPr>
         <p:spPr>
           <a:xfrm>
-            <a:off x="6302301" y="3057763"/>
-            <a:ext cx="1322991" cy="369332"/>
+            <a:off x="6184455" y="2596254"/>
+            <a:ext cx="1444113" cy="369332"/>
           </a:xfrm>
           <a:prstGeom prst="rect">
             <a:avLst/>
@@ -16435,6 +16606,36 @@
           <a:lstStyle/>
           <a:p>
             <a:r>
+              <a:rPr lang="de-DE" dirty="0" smtClean="0"/>
+              <a:t>Department: </a:t>
+            </a:r>
+            <a:endParaRPr lang="de-DE" dirty="0"/>
+          </a:p>
+        </p:txBody>
+      </p:sp>
+      <p:sp>
+        <p:nvSpPr>
+          <p:cNvPr id="43" name="Textfeld 42"/>
+          <p:cNvSpPr txBox="1"/>
+          <p:nvPr/>
+        </p:nvSpPr>
+        <p:spPr>
+          <a:xfrm>
+            <a:off x="6302301" y="4017123"/>
+            <a:ext cx="1322991" cy="369332"/>
+          </a:xfrm>
+          <a:prstGeom prst="rect">
+            <a:avLst/>
+          </a:prstGeom>
+          <a:noFill/>
+        </p:spPr>
+        <p:txBody>
+          <a:bodyPr wrap="none" rtlCol="0">
+            <a:spAutoFit/>
+          </a:bodyPr>
+          <a:lstStyle/>
+          <a:p>
+            <a:r>
               <a:rPr lang="de-DE" dirty="0" err="1" smtClean="0"/>
               <a:t>Permission</a:t>
             </a:r>
@@ -16448,13 +16649,13 @@
       </p:sp>
       <p:sp>
         <p:nvSpPr>
-          <p:cNvPr id="38" name="Rechteck 37"/>
+          <p:cNvPr id="44" name="Rechteck 43"/>
           <p:cNvSpPr/>
           <p:nvPr/>
         </p:nvSpPr>
         <p:spPr>
           <a:xfrm>
-            <a:off x="7634675" y="3067331"/>
+            <a:off x="7634675" y="4026691"/>
             <a:ext cx="2442536" cy="359764"/>
           </a:xfrm>
           <a:prstGeom prst="rect">
@@ -16505,13 +16706,13 @@
       </p:sp>
       <p:sp>
         <p:nvSpPr>
-          <p:cNvPr id="39" name="Textfeld 38"/>
+          <p:cNvPr id="45" name="Textfeld 44"/>
           <p:cNvSpPr txBox="1"/>
           <p:nvPr/>
         </p:nvSpPr>
         <p:spPr>
           <a:xfrm>
-            <a:off x="7673761" y="3075397"/>
+            <a:off x="7673761" y="4034757"/>
             <a:ext cx="676788" cy="369332"/>
           </a:xfrm>
           <a:prstGeom prst="rect">
@@ -16535,13 +16736,13 @@
       </p:sp>
       <p:sp>
         <p:nvSpPr>
-          <p:cNvPr id="40" name="Gleichschenkliges Dreieck 39"/>
+          <p:cNvPr id="46" name="Gleichschenkliges Dreieck 45"/>
           <p:cNvSpPr/>
           <p:nvPr/>
         </p:nvSpPr>
         <p:spPr>
           <a:xfrm rot="10800000">
-            <a:off x="9839456" y="3151648"/>
+            <a:off x="9839456" y="4111008"/>
             <a:ext cx="191710" cy="235747"/>
           </a:xfrm>
           <a:prstGeom prst="triangle">
@@ -16580,13 +16781,13 @@
       </p:sp>
       <p:sp>
         <p:nvSpPr>
-          <p:cNvPr id="41" name="Rechteck 40"/>
+          <p:cNvPr id="47" name="Rechteck 46"/>
           <p:cNvSpPr/>
           <p:nvPr/>
         </p:nvSpPr>
         <p:spPr>
           <a:xfrm>
-            <a:off x="7640513" y="3425219"/>
+            <a:off x="7640513" y="4384579"/>
             <a:ext cx="2436698" cy="417940"/>
           </a:xfrm>
           <a:prstGeom prst="rect">
@@ -16632,13 +16833,13 @@
       </p:sp>
       <p:sp>
         <p:nvSpPr>
-          <p:cNvPr id="42" name="Textfeld 41"/>
+          <p:cNvPr id="48" name="Textfeld 47"/>
           <p:cNvSpPr txBox="1"/>
           <p:nvPr/>
         </p:nvSpPr>
         <p:spPr>
           <a:xfrm>
-            <a:off x="7634675" y="3473827"/>
+            <a:off x="7634675" y="4433187"/>
             <a:ext cx="1476238" cy="369332"/>
           </a:xfrm>
           <a:prstGeom prst="rect">
@@ -16655,6 +16856,203 @@
             <a:r>
               <a:rPr lang="de-DE" dirty="0" smtClean="0"/>
               <a:t>Administrator</a:t>
+            </a:r>
+            <a:endParaRPr lang="de-DE" dirty="0"/>
+          </a:p>
+        </p:txBody>
+      </p:sp>
+      <p:sp>
+        <p:nvSpPr>
+          <p:cNvPr id="49" name="Rechteck 48"/>
+          <p:cNvSpPr/>
+          <p:nvPr/>
+        </p:nvSpPr>
+        <p:spPr>
+          <a:xfrm>
+            <a:off x="7615512" y="2082771"/>
+            <a:ext cx="1153734" cy="359764"/>
+          </a:xfrm>
+          <a:prstGeom prst="rect">
+            <a:avLst/>
+          </a:prstGeom>
+          <a:solidFill>
+            <a:schemeClr val="bg1"/>
+          </a:solidFill>
+          <a:ln>
+            <a:solidFill>
+              <a:schemeClr val="tx1"/>
+            </a:solidFill>
+          </a:ln>
+        </p:spPr>
+        <p:style>
+          <a:lnRef idx="2">
+            <a:schemeClr val="accent1">
+              <a:shade val="50000"/>
+            </a:schemeClr>
+          </a:lnRef>
+          <a:fillRef idx="1">
+            <a:schemeClr val="accent1"/>
+          </a:fillRef>
+          <a:effectRef idx="0">
+            <a:schemeClr val="accent1"/>
+          </a:effectRef>
+          <a:fontRef idx="minor">
+            <a:schemeClr val="lt1"/>
+          </a:fontRef>
+        </p:style>
+        <p:txBody>
+          <a:bodyPr rot="0" spcFirstLastPara="0" vertOverflow="overflow" horzOverflow="overflow" vert="horz" wrap="square" lIns="91440" tIns="45720" rIns="91440" bIns="45720" numCol="1" spcCol="0" rtlCol="0" fromWordArt="0" anchor="ctr" anchorCtr="0" forceAA="0" compatLnSpc="1">
+            <a:prstTxWarp prst="textNoShape">
+              <a:avLst/>
+            </a:prstTxWarp>
+            <a:noAutofit/>
+          </a:bodyPr>
+          <a:lstStyle/>
+          <a:p>
+            <a:pPr algn="ctr"/>
+            <a:r>
+              <a:rPr lang="de-DE" dirty="0" smtClean="0">
+                <a:solidFill>
+                  <a:schemeClr val="tx1"/>
+                </a:solidFill>
+              </a:rPr>
+              <a:t>2452</a:t>
+            </a:r>
+            <a:endParaRPr lang="de-DE" dirty="0">
+              <a:solidFill>
+                <a:schemeClr val="tx1"/>
+              </a:solidFill>
+            </a:endParaRPr>
+          </a:p>
+        </p:txBody>
+      </p:sp>
+      <p:sp>
+        <p:nvSpPr>
+          <p:cNvPr id="50" name="Rechteck 49"/>
+          <p:cNvSpPr/>
+          <p:nvPr/>
+        </p:nvSpPr>
+        <p:spPr>
+          <a:xfrm>
+            <a:off x="7615512" y="1634154"/>
+            <a:ext cx="2798064" cy="359764"/>
+          </a:xfrm>
+          <a:prstGeom prst="rect">
+            <a:avLst/>
+          </a:prstGeom>
+          <a:solidFill>
+            <a:schemeClr val="bg1"/>
+          </a:solidFill>
+          <a:ln>
+            <a:solidFill>
+              <a:schemeClr val="tx1"/>
+            </a:solidFill>
+          </a:ln>
+        </p:spPr>
+        <p:style>
+          <a:lnRef idx="2">
+            <a:schemeClr val="accent1">
+              <a:shade val="50000"/>
+            </a:schemeClr>
+          </a:lnRef>
+          <a:fillRef idx="1">
+            <a:schemeClr val="accent1"/>
+          </a:fillRef>
+          <a:effectRef idx="0">
+            <a:schemeClr val="accent1"/>
+          </a:effectRef>
+          <a:fontRef idx="minor">
+            <a:schemeClr val="lt1"/>
+          </a:fontRef>
+        </p:style>
+        <p:txBody>
+          <a:bodyPr rot="0" spcFirstLastPara="0" vertOverflow="overflow" horzOverflow="overflow" vert="horz" wrap="square" lIns="91440" tIns="45720" rIns="91440" bIns="45720" numCol="1" spcCol="0" rtlCol="0" fromWordArt="0" anchor="ctr" anchorCtr="0" forceAA="0" compatLnSpc="1">
+            <a:prstTxWarp prst="textNoShape">
+              <a:avLst/>
+            </a:prstTxWarp>
+            <a:noAutofit/>
+          </a:bodyPr>
+          <a:lstStyle/>
+          <a:p>
+            <a:r>
+              <a:rPr lang="de-DE" dirty="0" err="1" smtClean="0">
+                <a:solidFill>
+                  <a:schemeClr val="tx1"/>
+                </a:solidFill>
+              </a:rPr>
+              <a:t>Mannersdorf</a:t>
+            </a:r>
+            <a:r>
+              <a:rPr lang="de-DE" dirty="0" smtClean="0">
+                <a:solidFill>
+                  <a:schemeClr val="tx1"/>
+                </a:solidFill>
+              </a:rPr>
+              <a:t> an der Leitha</a:t>
+            </a:r>
+            <a:endParaRPr lang="de-DE" dirty="0">
+              <a:solidFill>
+                <a:schemeClr val="tx1"/>
+              </a:solidFill>
+            </a:endParaRPr>
+          </a:p>
+        </p:txBody>
+      </p:sp>
+      <p:sp>
+        <p:nvSpPr>
+          <p:cNvPr id="51" name="Textfeld 50"/>
+          <p:cNvSpPr txBox="1"/>
+          <p:nvPr/>
+        </p:nvSpPr>
+        <p:spPr>
+          <a:xfrm>
+            <a:off x="6800985" y="1606123"/>
+            <a:ext cx="795411" cy="369332"/>
+          </a:xfrm>
+          <a:prstGeom prst="rect">
+            <a:avLst/>
+          </a:prstGeom>
+          <a:noFill/>
+        </p:spPr>
+        <p:txBody>
+          <a:bodyPr wrap="none" rtlCol="0">
+            <a:spAutoFit/>
+          </a:bodyPr>
+          <a:lstStyle/>
+          <a:p>
+            <a:r>
+              <a:rPr lang="de-DE" dirty="0" smtClean="0"/>
+              <a:t>Place: </a:t>
+            </a:r>
+            <a:endParaRPr lang="de-DE" dirty="0"/>
+          </a:p>
+        </p:txBody>
+      </p:sp>
+      <p:sp>
+        <p:nvSpPr>
+          <p:cNvPr id="52" name="Textfeld 51"/>
+          <p:cNvSpPr txBox="1"/>
+          <p:nvPr/>
+        </p:nvSpPr>
+        <p:spPr>
+          <a:xfrm>
+            <a:off x="6446381" y="2101759"/>
+            <a:ext cx="1136850" cy="369332"/>
+          </a:xfrm>
+          <a:prstGeom prst="rect">
+            <a:avLst/>
+          </a:prstGeom>
+          <a:noFill/>
+        </p:spPr>
+        <p:txBody>
+          <a:bodyPr wrap="none" rtlCol="0">
+            <a:spAutoFit/>
+          </a:bodyPr>
+          <a:lstStyle/>
+          <a:p>
+            <a:r>
+              <a:rPr lang="de-DE" dirty="0" smtClean="0"/>
+              <a:t>ZIP-Code: </a:t>
             </a:r>
             <a:endParaRPr lang="de-DE" dirty="0"/>
           </a:p>

</xml_diff>